<commit_message>
Presentation is ready, need to deploy it on app engine.
</commit_message>
<xml_diff>
--- a/Android/Beginner/Presentation/Android Beginner-Getting started with Android.pptx
+++ b/Android/Beginner/Presentation/Android Beginner-Getting started with Android.pptx
@@ -78,8 +78,8 @@
         </p:nvSpPr>
         <p:spPr>
           <a:xfrm>
-            <a:off x="533520" y="1371600"/>
-            <a:ext cx="7850520" cy="1828800"/>
+            <a:off x="457200" y="273600"/>
+            <a:ext cx="8229240" cy="1145160"/>
           </a:xfrm>
           <a:prstGeom prst="rect">
             <a:avLst/>
@@ -106,7 +106,7 @@
         <p:spPr>
           <a:xfrm>
             <a:off x="457200" y="1604520"/>
-            <a:ext cx="8046000" cy="1896480"/>
+            <a:ext cx="8046360" cy="1896480"/>
           </a:xfrm>
           <a:prstGeom prst="rect">
             <a:avLst/>
@@ -132,7 +132,7 @@
         <p:spPr>
           <a:xfrm>
             <a:off x="457200" y="3681360"/>
-            <a:ext cx="8046000" cy="1896480"/>
+            <a:ext cx="8046360" cy="1896480"/>
           </a:xfrm>
           <a:prstGeom prst="rect">
             <a:avLst/>
@@ -179,8 +179,8 @@
         </p:nvSpPr>
         <p:spPr>
           <a:xfrm>
-            <a:off x="533520" y="1371600"/>
-            <a:ext cx="7850520" cy="1828800"/>
+            <a:off x="457200" y="273600"/>
+            <a:ext cx="8229240" cy="1145160"/>
           </a:xfrm>
           <a:prstGeom prst="rect">
             <a:avLst/>
@@ -332,8 +332,8 @@
         </p:nvSpPr>
         <p:spPr>
           <a:xfrm>
-            <a:off x="533520" y="1371600"/>
-            <a:ext cx="7850520" cy="1828800"/>
+            <a:off x="457200" y="273600"/>
+            <a:ext cx="8229240" cy="1145160"/>
           </a:xfrm>
           <a:prstGeom prst="rect">
             <a:avLst/>
@@ -433,8 +433,8 @@
         </p:nvSpPr>
         <p:spPr>
           <a:xfrm>
-            <a:off x="533520" y="1371600"/>
-            <a:ext cx="7850520" cy="1828800"/>
+            <a:off x="457200" y="273600"/>
+            <a:ext cx="8229240" cy="1145160"/>
           </a:xfrm>
           <a:prstGeom prst="rect">
             <a:avLst/>
@@ -461,7 +461,7 @@
         <p:spPr>
           <a:xfrm>
             <a:off x="457200" y="1604520"/>
-            <a:ext cx="8046000" cy="3976920"/>
+            <a:ext cx="8046360" cy="3977280"/>
           </a:xfrm>
           <a:prstGeom prst="rect">
             <a:avLst/>
@@ -509,8 +509,8 @@
         </p:nvSpPr>
         <p:spPr>
           <a:xfrm>
-            <a:off x="533520" y="1371600"/>
-            <a:ext cx="7850520" cy="1828800"/>
+            <a:off x="457200" y="273600"/>
+            <a:ext cx="8229240" cy="1145160"/>
           </a:xfrm>
           <a:prstGeom prst="rect">
             <a:avLst/>
@@ -537,7 +537,7 @@
         <p:spPr>
           <a:xfrm>
             <a:off x="457200" y="1604520"/>
-            <a:ext cx="8046000" cy="3976560"/>
+            <a:ext cx="8046360" cy="3976920"/>
           </a:xfrm>
           <a:prstGeom prst="rect">
             <a:avLst/>
@@ -584,8 +584,8 @@
         </p:nvSpPr>
         <p:spPr>
           <a:xfrm>
-            <a:off x="533520" y="1371600"/>
-            <a:ext cx="7850520" cy="1828800"/>
+            <a:off x="457200" y="273600"/>
+            <a:ext cx="8229240" cy="1145160"/>
           </a:xfrm>
           <a:prstGeom prst="rect">
             <a:avLst/>
@@ -612,7 +612,7 @@
         <p:spPr>
           <a:xfrm>
             <a:off x="457200" y="1604520"/>
-            <a:ext cx="3926160" cy="3976560"/>
+            <a:ext cx="3926160" cy="3976920"/>
           </a:xfrm>
           <a:prstGeom prst="rect">
             <a:avLst/>
@@ -638,7 +638,7 @@
         <p:spPr>
           <a:xfrm>
             <a:off x="4579920" y="1604520"/>
-            <a:ext cx="3926160" cy="3976560"/>
+            <a:ext cx="3926160" cy="3976920"/>
           </a:xfrm>
           <a:prstGeom prst="rect">
             <a:avLst/>
@@ -685,8 +685,8 @@
         </p:nvSpPr>
         <p:spPr>
           <a:xfrm>
-            <a:off x="533520" y="1371600"/>
-            <a:ext cx="7850520" cy="1828800"/>
+            <a:off x="457200" y="273600"/>
+            <a:ext cx="8229240" cy="1145160"/>
           </a:xfrm>
           <a:prstGeom prst="rect">
             <a:avLst/>
@@ -734,8 +734,8 @@
         </p:nvSpPr>
         <p:spPr>
           <a:xfrm>
-            <a:off x="533520" y="1371600"/>
-            <a:ext cx="7850520" cy="4209480"/>
+            <a:off x="457200" y="273600"/>
+            <a:ext cx="8229240" cy="5307840"/>
           </a:xfrm>
           <a:prstGeom prst="rect">
             <a:avLst/>
@@ -783,8 +783,8 @@
         </p:nvSpPr>
         <p:spPr>
           <a:xfrm>
-            <a:off x="533520" y="1371600"/>
-            <a:ext cx="7850520" cy="1828800"/>
+            <a:off x="457200" y="273600"/>
+            <a:ext cx="8229240" cy="1145160"/>
           </a:xfrm>
           <a:prstGeom prst="rect">
             <a:avLst/>
@@ -863,7 +863,7 @@
         <p:spPr>
           <a:xfrm>
             <a:off x="4579920" y="1604520"/>
-            <a:ext cx="3926160" cy="3976560"/>
+            <a:ext cx="3926160" cy="3976920"/>
           </a:xfrm>
           <a:prstGeom prst="rect">
             <a:avLst/>
@@ -910,8 +910,8 @@
         </p:nvSpPr>
         <p:spPr>
           <a:xfrm>
-            <a:off x="533520" y="1371600"/>
-            <a:ext cx="7850520" cy="1828800"/>
+            <a:off x="457200" y="273600"/>
+            <a:ext cx="8229240" cy="1145160"/>
           </a:xfrm>
           <a:prstGeom prst="rect">
             <a:avLst/>
@@ -938,7 +938,7 @@
         <p:spPr>
           <a:xfrm>
             <a:off x="457200" y="1604520"/>
-            <a:ext cx="3926160" cy="3976560"/>
+            <a:ext cx="3926160" cy="3976920"/>
           </a:xfrm>
           <a:prstGeom prst="rect">
             <a:avLst/>
@@ -1037,8 +1037,8 @@
         </p:nvSpPr>
         <p:spPr>
           <a:xfrm>
-            <a:off x="533520" y="1371600"/>
-            <a:ext cx="7850520" cy="1828800"/>
+            <a:off x="457200" y="273600"/>
+            <a:ext cx="8229240" cy="1145160"/>
           </a:xfrm>
           <a:prstGeom prst="rect">
             <a:avLst/>
@@ -1161,7 +1161,7 @@
         <p:spPr>
           <a:xfrm>
             <a:off x="-9360" y="-7200"/>
-            <a:ext cx="9162000" cy="1040400"/>
+            <a:ext cx="9161640" cy="1040040"/>
           </a:xfrm>
           <a:prstGeom prst="rect">
             <a:avLst/>
@@ -1188,7 +1188,7 @@
         <p:spPr>
           <a:xfrm>
             <a:off x="4381560" y="-7200"/>
-            <a:ext cx="4761360" cy="637200"/>
+            <a:ext cx="4761000" cy="636840"/>
           </a:xfrm>
           <a:prstGeom prst="rect">
             <a:avLst/>
@@ -1215,7 +1215,7 @@
         <p:spPr>
           <a:xfrm>
             <a:off x="-29160" y="421560"/>
-            <a:ext cx="9162000" cy="648000"/>
+            <a:ext cx="9161640" cy="647640"/>
           </a:xfrm>
           <a:prstGeom prst="rect">
             <a:avLst/>
@@ -1237,7 +1237,7 @@
         <p:spPr>
           <a:xfrm>
             <a:off x="-21600" y="495360"/>
-            <a:ext cx="9174600" cy="529200"/>
+            <a:ext cx="9174240" cy="528840"/>
           </a:xfrm>
           <a:prstGeom prst="rect">
             <a:avLst/>
@@ -1262,8 +1262,8 @@
         </p:nvSpPr>
         <p:spPr>
           <a:xfrm>
-            <a:off x="533520" y="1371600"/>
-            <a:ext cx="7850520" cy="1828440"/>
+            <a:off x="457200" y="273600"/>
+            <a:ext cx="8229240" cy="1144800"/>
           </a:xfrm>
           <a:prstGeom prst="rect">
             <a:avLst/>
@@ -1272,11 +1272,7 @@
         <p:txBody>
           <a:bodyPr anchor="ctr" bIns="0" lIns="0" rIns="0" tIns="0" wrap="none"/>
           <a:p>
-            <a:pPr algn="ctr">
-              <a:lnSpc>
-                <a:spcPct val="100000"/>
-              </a:lnSpc>
-            </a:pPr>
+            <a:pPr algn="ctr"/>
             <a:r>
               <a:rPr lang="en-IN"/>
               <a:t>Click to edit the title text format</a:t>
@@ -1298,7 +1294,7 @@
         <p:spPr>
           <a:xfrm>
             <a:off x="457200" y="1604520"/>
-            <a:ext cx="8046000" cy="3976560"/>
+            <a:ext cx="8046360" cy="3976920"/>
           </a:xfrm>
           <a:prstGeom prst="rect">
             <a:avLst/>
@@ -1307,6 +1303,11 @@
         <p:txBody>
           <a:bodyPr bIns="0" lIns="0" rIns="0" tIns="0" wrap="none"/>
           <a:p>
+            <a:pPr>
+              <a:buSzPct val="45000"/>
+              <a:buFont typeface="StarSymbol"/>
+              <a:buChar char=""/>
+            </a:pPr>
             <a:r>
               <a:rPr lang="en-IN"/>
               <a:t>Click to edit the outline text format</a:t>
@@ -1433,7 +1434,7 @@
         <p:spPr>
           <a:xfrm>
             <a:off x="533520" y="1371600"/>
-            <a:ext cx="7850520" cy="1827720"/>
+            <a:ext cx="7850160" cy="1827360"/>
           </a:xfrm>
           <a:prstGeom prst="rect">
             <a:avLst/>
@@ -1478,7 +1479,7 @@
         <p:spPr>
           <a:xfrm>
             <a:off x="533520" y="3228480"/>
-            <a:ext cx="7853760" cy="1751400"/>
+            <a:ext cx="7853400" cy="1751040"/>
           </a:xfrm>
           <a:prstGeom prst="rect">
             <a:avLst/>
@@ -1520,7 +1521,7 @@
         <p:spPr>
           <a:xfrm>
             <a:off x="395640" y="1989000"/>
-            <a:ext cx="4456440" cy="2032920"/>
+            <a:ext cx="4456080" cy="2032560"/>
           </a:xfrm>
           <a:prstGeom prst="rect">
             <a:avLst/>
@@ -1587,7 +1588,7 @@
         <p:spPr>
           <a:xfrm>
             <a:off x="648000" y="630720"/>
-            <a:ext cx="7920000" cy="953280"/>
+            <a:ext cx="7919640" cy="952920"/>
           </a:xfrm>
           <a:prstGeom prst="rect">
             <a:avLst/>
@@ -1629,7 +1630,7 @@
         <p:spPr>
           <a:xfrm>
             <a:off x="1116000" y="1584000"/>
-            <a:ext cx="7056000" cy="5004000"/>
+            <a:ext cx="7055640" cy="5003640"/>
           </a:xfrm>
           <a:prstGeom prst="rect">
             <a:avLst/>
@@ -1696,7 +1697,7 @@
         <p:spPr>
           <a:xfrm>
             <a:off x="457560" y="704520"/>
-            <a:ext cx="8228520" cy="1141920"/>
+            <a:ext cx="8228160" cy="1141560"/>
           </a:xfrm>
           <a:prstGeom prst="rect">
             <a:avLst/>
@@ -1732,7 +1733,7 @@
         <p:spPr>
           <a:xfrm>
             <a:off x="457560" y="1935720"/>
-            <a:ext cx="8228520" cy="3967920"/>
+            <a:ext cx="8228160" cy="3967560"/>
           </a:xfrm>
           <a:prstGeom prst="rect">
             <a:avLst/>
@@ -1882,7 +1883,7 @@
         <p:spPr>
           <a:xfrm>
             <a:off x="576000" y="1236960"/>
-            <a:ext cx="8228520" cy="562320"/>
+            <a:ext cx="8228160" cy="561960"/>
           </a:xfrm>
           <a:prstGeom prst="rect">
             <a:avLst/>
@@ -1927,7 +1928,7 @@
         <p:spPr>
           <a:xfrm>
             <a:off x="432000" y="2367000"/>
-            <a:ext cx="8228520" cy="2024280"/>
+            <a:ext cx="8228160" cy="2023920"/>
           </a:xfrm>
           <a:prstGeom prst="rect">
             <a:avLst/>
@@ -2002,7 +2003,7 @@
         <p:spPr>
           <a:xfrm>
             <a:off x="6553440" y="6416640"/>
-            <a:ext cx="2132640" cy="363960"/>
+            <a:ext cx="2132280" cy="363600"/>
           </a:xfrm>
           <a:prstGeom prst="rect">
             <a:avLst/>
@@ -2016,7 +2017,7 @@
                 <a:spcPct val="100000"/>
               </a:lnSpc>
             </a:pPr>
-            <a:fld id="{E13141C1-7191-41C1-A1D1-615131517131}" type="slidenum">
+            <a:fld id="{D1A151E1-5191-41D1-8171-61B101014111}" type="slidenum">
               <a:rPr lang="en-IN">
                 <a:solidFill>
                   <a:srgbClr val="000000"/>
@@ -2089,7 +2090,7 @@
         <p:spPr>
           <a:xfrm>
             <a:off x="282600" y="938880"/>
-            <a:ext cx="8228520" cy="614880"/>
+            <a:ext cx="8228160" cy="614520"/>
           </a:xfrm>
           <a:prstGeom prst="rect">
             <a:avLst/>
@@ -2125,7 +2126,7 @@
         <p:spPr>
           <a:xfrm>
             <a:off x="457560" y="1922040"/>
-            <a:ext cx="8228520" cy="3693240"/>
+            <a:ext cx="8228160" cy="3692880"/>
           </a:xfrm>
           <a:prstGeom prst="rect">
             <a:avLst/>
@@ -2228,7 +2229,7 @@
         <p:spPr>
           <a:xfrm>
             <a:off x="7200000" y="6443280"/>
-            <a:ext cx="1727280" cy="252000"/>
+            <a:ext cx="1726920" cy="251640"/>
           </a:xfrm>
           <a:prstGeom prst="rect">
             <a:avLst/>
@@ -2242,7 +2243,7 @@
                 <a:spcPct val="100000"/>
               </a:lnSpc>
             </a:pPr>
-            <a:fld id="{B1B13151-F1F1-4151-81E1-81113141A141}" type="slidenum">
+            <a:fld id="{D1119151-B1C1-41E1-B131-2151D191E1A1}" type="slidenum">
               <a:rPr lang="en-IN">
                 <a:solidFill>
                   <a:srgbClr val="000000"/>
@@ -2315,7 +2316,7 @@
         <p:spPr>
           <a:xfrm>
             <a:off x="432000" y="720000"/>
-            <a:ext cx="8228520" cy="791280"/>
+            <a:ext cx="8228160" cy="790920"/>
           </a:xfrm>
           <a:prstGeom prst="rect">
             <a:avLst/>
@@ -2351,7 +2352,7 @@
         <p:spPr>
           <a:xfrm>
             <a:off x="457560" y="1863000"/>
-            <a:ext cx="8228520" cy="3824280"/>
+            <a:ext cx="8228160" cy="3823920"/>
           </a:xfrm>
           <a:prstGeom prst="rect">
             <a:avLst/>
@@ -2458,7 +2459,7 @@
         <p:spPr>
           <a:xfrm>
             <a:off x="6553440" y="6416640"/>
-            <a:ext cx="2132640" cy="363960"/>
+            <a:ext cx="2132280" cy="363600"/>
           </a:xfrm>
           <a:prstGeom prst="rect">
             <a:avLst/>
@@ -2472,7 +2473,7 @@
                 <a:spcPct val="100000"/>
               </a:lnSpc>
             </a:pPr>
-            <a:fld id="{2161C101-E171-4131-91E1-010111316161}" type="slidenum">
+            <a:fld id="{5111D1C1-F1B1-4181-B131-21A18191D141}" type="slidenum">
               <a:rPr lang="en-IN">
                 <a:solidFill>
                   <a:srgbClr val="000000"/>
@@ -2551,7 +2552,7 @@
         <p:spPr>
           <a:xfrm>
             <a:off x="5596560" y="2410560"/>
-            <a:ext cx="3402720" cy="4302000"/>
+            <a:ext cx="3402360" cy="4301640"/>
           </a:xfrm>
           <a:prstGeom prst="rect">
             <a:avLst/>
@@ -2567,7 +2568,7 @@
         <p:spPr>
           <a:xfrm>
             <a:off x="608400" y="881280"/>
-            <a:ext cx="5295600" cy="3385800"/>
+            <a:ext cx="5295240" cy="3385440"/>
           </a:xfrm>
           <a:prstGeom prst="rect">
             <a:avLst/>
@@ -2729,7 +2730,7 @@
         <p:spPr>
           <a:xfrm>
             <a:off x="447480" y="1872000"/>
-            <a:ext cx="8228520" cy="1141920"/>
+            <a:ext cx="8228160" cy="1141560"/>
           </a:xfrm>
           <a:prstGeom prst="rect">
             <a:avLst/>
@@ -2816,7 +2817,7 @@
         <p:spPr>
           <a:xfrm>
             <a:off x="457560" y="704520"/>
-            <a:ext cx="8228520" cy="1141920"/>
+            <a:ext cx="8228160" cy="1141560"/>
           </a:xfrm>
           <a:prstGeom prst="rect">
             <a:avLst/>
@@ -2852,7 +2853,7 @@
         <p:spPr>
           <a:xfrm>
             <a:off x="457560" y="1935720"/>
-            <a:ext cx="8228520" cy="4388040"/>
+            <a:ext cx="8228160" cy="4387680"/>
           </a:xfrm>
           <a:prstGeom prst="rect">
             <a:avLst/>
@@ -3030,7 +3031,7 @@
         <p:spPr>
           <a:xfrm>
             <a:off x="457560" y="704520"/>
-            <a:ext cx="8228520" cy="1141920"/>
+            <a:ext cx="8228160" cy="1141560"/>
           </a:xfrm>
           <a:prstGeom prst="rect">
             <a:avLst/>
@@ -3066,7 +3067,7 @@
         <p:spPr>
           <a:xfrm>
             <a:off x="457560" y="1935720"/>
-            <a:ext cx="8228520" cy="4388040"/>
+            <a:ext cx="8228160" cy="4387680"/>
           </a:xfrm>
           <a:prstGeom prst="rect">
             <a:avLst/>
@@ -3254,7 +3255,7 @@
         <p:spPr>
           <a:xfrm>
             <a:off x="611640" y="980640"/>
-            <a:ext cx="972360" cy="1757160"/>
+            <a:ext cx="972000" cy="1756800"/>
           </a:xfrm>
           <a:prstGeom prst="rect">
             <a:avLst/>
@@ -3276,7 +3277,7 @@
         <p:spPr>
           <a:xfrm>
             <a:off x="2339640" y="908640"/>
-            <a:ext cx="1134720" cy="1874880"/>
+            <a:ext cx="1134360" cy="1874520"/>
           </a:xfrm>
           <a:prstGeom prst="rect">
             <a:avLst/>
@@ -3298,7 +3299,7 @@
         <p:spPr>
           <a:xfrm>
             <a:off x="3996000" y="836640"/>
-            <a:ext cx="1078920" cy="1882800"/>
+            <a:ext cx="1078560" cy="1882440"/>
           </a:xfrm>
           <a:prstGeom prst="rect">
             <a:avLst/>
@@ -3320,7 +3321,7 @@
         <p:spPr>
           <a:xfrm>
             <a:off x="467640" y="3717000"/>
-            <a:ext cx="2680920" cy="1943280"/>
+            <a:ext cx="2680560" cy="1942920"/>
           </a:xfrm>
           <a:prstGeom prst="rect">
             <a:avLst/>
@@ -3342,7 +3343,7 @@
         <p:spPr>
           <a:xfrm>
             <a:off x="3420000" y="3645000"/>
-            <a:ext cx="2548440" cy="2055960"/>
+            <a:ext cx="2548080" cy="2055600"/>
           </a:xfrm>
           <a:prstGeom prst="rect">
             <a:avLst/>
@@ -3364,7 +3365,7 @@
         <p:spPr>
           <a:xfrm>
             <a:off x="6516360" y="3789000"/>
-            <a:ext cx="2315880" cy="1936080"/>
+            <a:ext cx="2315520" cy="1935720"/>
           </a:xfrm>
           <a:prstGeom prst="rect">
             <a:avLst/>
@@ -3431,7 +3432,7 @@
         <p:spPr>
           <a:xfrm>
             <a:off x="827640" y="2853000"/>
-            <a:ext cx="3753720" cy="1141920"/>
+            <a:ext cx="3753360" cy="1141560"/>
           </a:xfrm>
           <a:prstGeom prst="rect">
             <a:avLst/>
@@ -3473,7 +3474,7 @@
         <p:spPr>
           <a:xfrm>
             <a:off x="4860000" y="908640"/>
-            <a:ext cx="4083480" cy="4945320"/>
+            <a:ext cx="4083120" cy="4944960"/>
           </a:xfrm>
           <a:prstGeom prst="rect">
             <a:avLst/>
@@ -3540,7 +3541,7 @@
         <p:spPr>
           <a:xfrm>
             <a:off x="576000" y="1296000"/>
-            <a:ext cx="7991280" cy="4300200"/>
+            <a:ext cx="7990920" cy="4299840"/>
           </a:xfrm>
           <a:prstGeom prst="rect">
             <a:avLst/>
@@ -3596,6 +3597,23 @@
                 <a:spcPct val="100000"/>
               </a:lnSpc>
             </a:pPr>
+            <a:endParaRPr/>
+          </a:p>
+          <a:p>
+            <a:pPr>
+              <a:lnSpc>
+                <a:spcPct val="100000"/>
+              </a:lnSpc>
+            </a:pPr>
+            <a:r>
+              <a:rPr lang="en-IN" sz="5000">
+                <a:solidFill>
+                  <a:srgbClr val="04617b"/>
+                </a:solidFill>
+                <a:latin typeface="Calibri"/>
+              </a:rPr>
+              <a:t>Open Source</a:t>
+            </a:r>
             <a:endParaRPr/>
           </a:p>
           <a:p>
@@ -3668,7 +3686,7 @@
         <p:spPr>
           <a:xfrm>
             <a:off x="360000" y="4320000"/>
-            <a:ext cx="8228520" cy="1141920"/>
+            <a:ext cx="8228160" cy="1141560"/>
           </a:xfrm>
           <a:prstGeom prst="rect">
             <a:avLst/>
@@ -3761,7 +3779,7 @@
         <p:spPr>
           <a:xfrm>
             <a:off x="720360" y="414720"/>
-            <a:ext cx="7379640" cy="6136920"/>
+            <a:ext cx="7379280" cy="6136560"/>
           </a:xfrm>
           <a:prstGeom prst="rect">
             <a:avLst/>
@@ -3828,7 +3846,7 @@
         <p:spPr>
           <a:xfrm>
             <a:off x="457560" y="273600"/>
-            <a:ext cx="8228520" cy="1144080"/>
+            <a:ext cx="8228160" cy="1143720"/>
           </a:xfrm>
           <a:prstGeom prst="rect">
             <a:avLst/>
@@ -3865,7 +3883,7 @@
         <p:spPr>
           <a:xfrm>
             <a:off x="1163880" y="1548000"/>
-            <a:ext cx="6899760" cy="5219280"/>
+            <a:ext cx="6899400" cy="5218920"/>
           </a:xfrm>
           <a:prstGeom prst="rect">
             <a:avLst/>

</xml_diff>

<commit_message>
Notificaiton Demo app has been added into the repo. Not fully working yet.
</commit_message>
<xml_diff>
--- a/Android/Beginner/Presentation/Android Beginner-Getting started with Android.pptx
+++ b/Android/Beginner/Presentation/Android Beginner-Getting started with Android.pptx
@@ -2017,7 +2017,7 @@
                 <a:spcPct val="100000"/>
               </a:lnSpc>
             </a:pPr>
-            <a:fld id="{D1A151E1-5191-41D1-8171-61B101014111}" type="slidenum">
+            <a:fld id="{2100E121-11D1-4121-B1C1-B1E1A1D1C1B1}" type="slidenum">
               <a:rPr lang="en-IN">
                 <a:solidFill>
                   <a:srgbClr val="000000"/>
@@ -2243,7 +2243,7 @@
                 <a:spcPct val="100000"/>
               </a:lnSpc>
             </a:pPr>
-            <a:fld id="{D1119151-B1C1-41E1-B131-2151D191E1A1}" type="slidenum">
+            <a:fld id="{41B1C1B1-4121-4141-9171-3131E1212151}" type="slidenum">
               <a:rPr lang="en-IN">
                 <a:solidFill>
                   <a:srgbClr val="000000"/>
@@ -2473,7 +2473,7 @@
                 <a:spcPct val="100000"/>
               </a:lnSpc>
             </a:pPr>
-            <a:fld id="{5111D1C1-F1B1-4181-B131-21A18191D141}" type="slidenum">
+            <a:fld id="{B10181A1-91E1-41F1-8111-5141A101E111}" type="slidenum">
               <a:rPr lang="en-IN">
                 <a:solidFill>
                   <a:srgbClr val="000000"/>

</xml_diff>